<commit_message>
fixed errors in SAM bitwise flag explanation
</commit_message>
<xml_diff>
--- a/assets/lectures/cbw/2019/mini/RNASeq_MiniLecture_03_03_SAM_BAM_BED.pptx
+++ b/assets/lectures/cbw/2019/mini/RNASeq_MiniLecture_03_03_SAM_BAM_BED.pptx
@@ -212,7 +212,7 @@
           <a:p>
             <a:fld id="{3F074802-55CA-9B40-9191-B744CF71FA91}" type="datetimeFigureOut">
               <a:rPr lang="en-US" smtClean="0"/>
-              <a:t>6/10/19</a:t>
+              <a:t>11/4/19</a:t>
             </a:fld>
             <a:endParaRPr lang="en-US"/>
           </a:p>
@@ -904,14 +904,14 @@
           </a:ln>
           <a:extLst>
             <a:ext uri="{909E8E84-426E-40dd-AFC4-6F175D3DCCD1}">
-              <a14:hiddenFill xmlns:a14="http://schemas.microsoft.com/office/drawing/2010/main" xmlns="">
+              <a14:hiddenFill xmlns="" xmlns:a14="http://schemas.microsoft.com/office/drawing/2010/main">
                 <a:solidFill>
                   <a:srgbClr val="FFFFFF"/>
                 </a:solidFill>
               </a14:hiddenFill>
             </a:ext>
             <a:ext uri="{91240B29-F687-4f45-9708-019B960494DF}">
-              <a14:hiddenLine xmlns:a14="http://schemas.microsoft.com/office/drawing/2010/main" xmlns="" w="9525">
+              <a14:hiddenLine xmlns="" xmlns:a14="http://schemas.microsoft.com/office/drawing/2010/main" w="9525">
                 <a:solidFill>
                   <a:srgbClr val="000000"/>
                 </a:solidFill>
@@ -6805,14 +6805,14 @@
           </a:ln>
           <a:extLst>
             <a:ext uri="{909E8E84-426E-40dd-AFC4-6F175D3DCCD1}">
-              <a14:hiddenFill xmlns:a14="http://schemas.microsoft.com/office/drawing/2010/main" xmlns="">
+              <a14:hiddenFill xmlns="" xmlns:a14="http://schemas.microsoft.com/office/drawing/2010/main">
                 <a:solidFill>
                   <a:srgbClr val="FFFFFF"/>
                 </a:solidFill>
               </a14:hiddenFill>
             </a:ext>
             <a:ext uri="{91240B29-F687-4f45-9708-019B960494DF}">
-              <a14:hiddenLine xmlns:a14="http://schemas.microsoft.com/office/drawing/2010/main" xmlns="" w="9525">
+              <a14:hiddenLine xmlns="" xmlns:a14="http://schemas.microsoft.com/office/drawing/2010/main" w="9525">
                 <a:solidFill>
                   <a:srgbClr val="000000"/>
                 </a:solidFill>
@@ -7809,14 +7809,14 @@
           </a:ln>
           <a:extLst>
             <a:ext uri="{909E8E84-426E-40dd-AFC4-6F175D3DCCD1}">
-              <a14:hiddenFill xmlns:a14="http://schemas.microsoft.com/office/drawing/2010/main" xmlns="">
+              <a14:hiddenFill xmlns="" xmlns:a14="http://schemas.microsoft.com/office/drawing/2010/main">
                 <a:solidFill>
                   <a:srgbClr val="FFFFFF"/>
                 </a:solidFill>
               </a14:hiddenFill>
             </a:ext>
             <a:ext uri="{91240B29-F687-4f45-9708-019B960494DF}">
-              <a14:hiddenLine xmlns:a14="http://schemas.microsoft.com/office/drawing/2010/main" xmlns="" w="9525">
+              <a14:hiddenLine xmlns="" xmlns:a14="http://schemas.microsoft.com/office/drawing/2010/main" w="9525">
                 <a:solidFill>
                   <a:srgbClr val="000000"/>
                 </a:solidFill>
@@ -8683,14 +8683,14 @@
           </a:ln>
           <a:extLst>
             <a:ext uri="{909E8E84-426E-40dd-AFC4-6F175D3DCCD1}">
-              <a14:hiddenFill xmlns:a14="http://schemas.microsoft.com/office/drawing/2010/main" xmlns="">
+              <a14:hiddenFill xmlns="" xmlns:a14="http://schemas.microsoft.com/office/drawing/2010/main">
                 <a:solidFill>
                   <a:srgbClr val="FFFFFF"/>
                 </a:solidFill>
               </a14:hiddenFill>
             </a:ext>
             <a:ext uri="{91240B29-F687-4f45-9708-019B960494DF}">
-              <a14:hiddenLine xmlns:a14="http://schemas.microsoft.com/office/drawing/2010/main" xmlns="" w="9525">
+              <a14:hiddenLine xmlns="" xmlns:a14="http://schemas.microsoft.com/office/drawing/2010/main" w="9525">
                 <a:solidFill>
                   <a:srgbClr val="000000"/>
                 </a:solidFill>
@@ -13279,14 +13279,14 @@
           </a:ln>
           <a:extLst>
             <a:ext uri="{909E8E84-426E-40dd-AFC4-6F175D3DCCD1}">
-              <a14:hiddenFill xmlns:a14="http://schemas.microsoft.com/office/drawing/2010/main" xmlns="">
+              <a14:hiddenFill xmlns="" xmlns:a14="http://schemas.microsoft.com/office/drawing/2010/main">
                 <a:solidFill>
                   <a:srgbClr val="FFFFFF"/>
                 </a:solidFill>
               </a14:hiddenFill>
             </a:ext>
             <a:ext uri="{91240B29-F687-4f45-9708-019B960494DF}">
-              <a14:hiddenLine xmlns:a14="http://schemas.microsoft.com/office/drawing/2010/main" xmlns="" w="9525">
+              <a14:hiddenLine xmlns="" xmlns:a14="http://schemas.microsoft.com/office/drawing/2010/main" w="9525">
                 <a:solidFill>
                   <a:srgbClr val="000000"/>
                 </a:solidFill>
@@ -13320,14 +13320,14 @@
           </a:ln>
           <a:extLst>
             <a:ext uri="{909E8E84-426E-40dd-AFC4-6F175D3DCCD1}">
-              <a14:hiddenFill xmlns:a14="http://schemas.microsoft.com/office/drawing/2010/main" xmlns="">
+              <a14:hiddenFill xmlns="" xmlns:a14="http://schemas.microsoft.com/office/drawing/2010/main">
                 <a:solidFill>
                   <a:srgbClr val="FFFFFF"/>
                 </a:solidFill>
               </a14:hiddenFill>
             </a:ext>
             <a:ext uri="{91240B29-F687-4f45-9708-019B960494DF}">
-              <a14:hiddenLine xmlns:a14="http://schemas.microsoft.com/office/drawing/2010/main" xmlns="" w="9525">
+              <a14:hiddenLine xmlns="" xmlns:a14="http://schemas.microsoft.com/office/drawing/2010/main" w="9525">
                 <a:solidFill>
                   <a:srgbClr val="000000"/>
                 </a:solidFill>
@@ -13481,14 +13481,14 @@
           </a:ln>
           <a:extLst>
             <a:ext uri="{909E8E84-426E-40dd-AFC4-6F175D3DCCD1}">
-              <a14:hiddenFill xmlns:a14="http://schemas.microsoft.com/office/drawing/2010/main" xmlns="">
+              <a14:hiddenFill xmlns="" xmlns:a14="http://schemas.microsoft.com/office/drawing/2010/main">
                 <a:solidFill>
                   <a:srgbClr val="FFFFFF"/>
                 </a:solidFill>
               </a14:hiddenFill>
             </a:ext>
             <a:ext uri="{91240B29-F687-4f45-9708-019B960494DF}">
-              <a14:hiddenLine xmlns:a14="http://schemas.microsoft.com/office/drawing/2010/main" xmlns="" w="9525">
+              <a14:hiddenLine xmlns="" xmlns:a14="http://schemas.microsoft.com/office/drawing/2010/main" w="9525">
                 <a:solidFill>
                   <a:srgbClr val="000000"/>
                 </a:solidFill>
@@ -14860,14 +14860,14 @@
           </a:ln>
           <a:extLst>
             <a:ext uri="{909E8E84-426E-40dd-AFC4-6F175D3DCCD1}">
-              <a14:hiddenFill xmlns:a14="http://schemas.microsoft.com/office/drawing/2010/main" xmlns="">
+              <a14:hiddenFill xmlns="" xmlns:a14="http://schemas.microsoft.com/office/drawing/2010/main">
                 <a:solidFill>
                   <a:srgbClr val="FFFFFF"/>
                 </a:solidFill>
               </a14:hiddenFill>
             </a:ext>
             <a:ext uri="{91240B29-F687-4f45-9708-019B960494DF}">
-              <a14:hiddenLine xmlns:a14="http://schemas.microsoft.com/office/drawing/2010/main" xmlns="" w="9525">
+              <a14:hiddenLine xmlns="" xmlns:a14="http://schemas.microsoft.com/office/drawing/2010/main" w="9525">
                 <a:solidFill>
                   <a:srgbClr val="000000"/>
                 </a:solidFill>
@@ -15093,7 +15093,7 @@
             </a:pPr>
             <a:r>
               <a:rPr lang="en-US" sz="1800" dirty="0"/>
-              <a:t>Stored as a binary string of length 11 instead of 11 columns of data</a:t>
+              <a:t>Stored as a binary string of length 12 instead of 12 columns of data</a:t>
             </a:r>
           </a:p>
           <a:p>
@@ -15102,7 +15102,7 @@
             </a:pPr>
             <a:r>
               <a:rPr lang="en-US" sz="1800" dirty="0"/>
-              <a:t>Value of ‘1’ indicates the flag is set.  e.g. 00100000000</a:t>
+              <a:t>Value of ‘1’ indicates the flag is set.  e.g. 001000000000</a:t>
             </a:r>
           </a:p>
           <a:p>
@@ -15111,11 +15111,11 @@
             </a:pPr>
             <a:r>
               <a:rPr lang="en-US" sz="1800" dirty="0"/>
-              <a:t>All combinations can be represented as a number from 1 to 2048 (i.e. 2</a:t>
+              <a:t>All combinations can be represented as a number from 0 to 4095 (i.e. 2</a:t>
             </a:r>
             <a:r>
               <a:rPr lang="en-US" sz="1800" baseline="30000" dirty="0"/>
-              <a:t>11</a:t>
+              <a:t>12</a:t>
             </a:r>
             <a:r>
               <a:rPr lang="en-US" sz="1800" dirty="0"/>
@@ -15155,14 +15155,14 @@
           </a:ln>
           <a:extLst>
             <a:ext uri="{909E8E84-426E-40dd-AFC4-6F175D3DCCD1}">
-              <a14:hiddenFill xmlns:a14="http://schemas.microsoft.com/office/drawing/2010/main" xmlns="">
+              <a14:hiddenFill xmlns="" xmlns:a14="http://schemas.microsoft.com/office/drawing/2010/main">
                 <a:solidFill>
                   <a:srgbClr val="FFFFFF"/>
                 </a:solidFill>
               </a14:hiddenFill>
             </a:ext>
             <a:ext uri="{91240B29-F687-4f45-9708-019B960494DF}">
-              <a14:hiddenLine xmlns:a14="http://schemas.microsoft.com/office/drawing/2010/main" xmlns="" w="9525">
+              <a14:hiddenLine xmlns="" xmlns:a14="http://schemas.microsoft.com/office/drawing/2010/main" w="9525">
                 <a:solidFill>
                   <a:srgbClr val="000000"/>
                 </a:solidFill>
@@ -15528,14 +15528,14 @@
           </a:ln>
           <a:extLst>
             <a:ext uri="{909E8E84-426E-40dd-AFC4-6F175D3DCCD1}">
-              <a14:hiddenFill xmlns:a14="http://schemas.microsoft.com/office/drawing/2010/main" xmlns="">
+              <a14:hiddenFill xmlns="" xmlns:a14="http://schemas.microsoft.com/office/drawing/2010/main">
                 <a:solidFill>
                   <a:srgbClr val="FFFFFF"/>
                 </a:solidFill>
               </a14:hiddenFill>
             </a:ext>
             <a:ext uri="{91240B29-F687-4f45-9708-019B960494DF}">
-              <a14:hiddenLine xmlns:a14="http://schemas.microsoft.com/office/drawing/2010/main" xmlns="" w="9525">
+              <a14:hiddenLine xmlns="" xmlns:a14="http://schemas.microsoft.com/office/drawing/2010/main" w="9525">
                 <a:solidFill>
                   <a:srgbClr val="000000"/>
                 </a:solidFill>

</xml_diff>